<commit_message>
Combining presentations for 4/1
</commit_message>
<xml_diff>
--- a/Presentations/ProjectPresentation_04-01-JM.pptx
+++ b/Presentations/ProjectPresentation_04-01-JM.pptx
@@ -15,7 +15,6 @@
     <p:sldId id="350" r:id="rId9"/>
     <p:sldId id="329" r:id="rId10"/>
     <p:sldId id="334" r:id="rId11"/>
-    <p:sldId id="339" r:id="rId12"/>
   </p:sldIdLst>
   <p:sldSz cx="12192000" cy="6858000"/>
   <p:notesSz cx="6858000" cy="9144000"/>
@@ -3615,7 +3614,7 @@
             <a:pPr lvl="1"/>
             <a:r>
               <a:rPr lang="en-US" dirty="0"/>
-              <a:t>Extend weights to full 16 bit width (Bit/Source lines), and full 96 weights (Word line) </a:t>
+              <a:t>Extend weights to full 16-bit width (Bit/Source lines), and full 96 weights (Word line) </a:t>
             </a:r>
           </a:p>
           <a:p>
@@ -3667,722 +3666,6 @@
     <p:extLst>
       <p:ext uri="{BB962C8B-B14F-4D97-AF65-F5344CB8AC3E}">
         <p14:creationId xmlns:p14="http://schemas.microsoft.com/office/powerpoint/2010/main" val="3936418568"/>
-      </p:ext>
-    </p:extLst>
-  </p:cSld>
-  <p:clrMapOvr>
-    <a:masterClrMapping/>
-  </p:clrMapOvr>
-</p:sld>
-</file>
-
-<file path=ppt/slides/slide11.xml><?xml version="1.0" encoding="utf-8"?>
-<p:sld xmlns:a="http://schemas.openxmlformats.org/drawingml/2006/main" xmlns:r="http://schemas.openxmlformats.org/officeDocument/2006/relationships" xmlns:p="http://schemas.openxmlformats.org/presentationml/2006/main">
-  <p:cSld>
-    <p:spTree>
-      <p:nvGrpSpPr>
-        <p:cNvPr id="1" name=""/>
-        <p:cNvGrpSpPr/>
-        <p:nvPr/>
-      </p:nvGrpSpPr>
-      <p:grpSpPr>
-        <a:xfrm>
-          <a:off x="0" y="0"/>
-          <a:ext cx="0" cy="0"/>
-          <a:chOff x="0" y="0"/>
-          <a:chExt cx="0" cy="0"/>
-        </a:xfrm>
-      </p:grpSpPr>
-      <p:sp>
-        <p:nvSpPr>
-          <p:cNvPr id="2" name="Title 1">
-            <a:extLst>
-              <a:ext uri="{FF2B5EF4-FFF2-40B4-BE49-F238E27FC236}">
-                <a16:creationId xmlns:a16="http://schemas.microsoft.com/office/drawing/2014/main" id="{BBFFCFBD-10F3-A942-97D6-A91A58E96A53}"/>
-              </a:ext>
-            </a:extLst>
-          </p:cNvPr>
-          <p:cNvSpPr>
-            <a:spLocks noGrp="1"/>
-          </p:cNvSpPr>
-          <p:nvPr>
-            <p:ph type="title"/>
-          </p:nvPr>
-        </p:nvSpPr>
-        <p:spPr/>
-        <p:txBody>
-          <a:bodyPr/>
-          <a:lstStyle/>
-          <a:p>
-            <a:r>
-              <a:rPr lang="en-US" dirty="0"/>
-              <a:t>References</a:t>
-            </a:r>
-          </a:p>
-        </p:txBody>
-      </p:sp>
-      <p:sp>
-        <p:nvSpPr>
-          <p:cNvPr id="3" name="Content Placeholder 2">
-            <a:extLst>
-              <a:ext uri="{FF2B5EF4-FFF2-40B4-BE49-F238E27FC236}">
-                <a16:creationId xmlns:a16="http://schemas.microsoft.com/office/drawing/2014/main" id="{8B5CE503-65D2-434B-B746-E03119BAFA7F}"/>
-              </a:ext>
-            </a:extLst>
-          </p:cNvPr>
-          <p:cNvSpPr>
-            <a:spLocks noGrp="1"/>
-          </p:cNvSpPr>
-          <p:nvPr>
-            <p:ph idx="1"/>
-          </p:nvPr>
-        </p:nvSpPr>
-        <p:spPr>
-          <a:xfrm>
-            <a:off x="2009955" y="1328468"/>
-            <a:ext cx="10182045" cy="5529531"/>
-          </a:xfrm>
-        </p:spPr>
-        <p:txBody>
-          <a:bodyPr>
-            <a:normAutofit fontScale="32500" lnSpcReduction="20000"/>
-          </a:bodyPr>
-          <a:lstStyle/>
-          <a:p>
-            <a:pPr marL="0" indent="0">
-              <a:buNone/>
-            </a:pPr>
-            <a:r>
-              <a:rPr lang="en-US" dirty="0"/>
-              <a:t>[1] 	Ding, R., Tian, X., Bai, G., </a:t>
-            </a:r>
-            <a:r>
-              <a:rPr lang="en-US" dirty="0" err="1"/>
-              <a:t>Su</a:t>
-            </a:r>
-            <a:r>
-              <a:rPr lang="en-US" dirty="0"/>
-              <a:t>, G. &amp; Wu, X. Hardware implementation of convolutional neural network for face feature extraction. in </a:t>
-            </a:r>
-            <a:r>
-              <a:rPr lang="en-US" i="1" dirty="0"/>
-              <a:t>Proceedings of International Conference on ASIC</a:t>
-            </a:r>
-            <a:r>
-              <a:rPr lang="en-US" dirty="0"/>
-              <a:t> (IEEE Computer Society, 2019). doi:10.1109/ASICON47005.2019.8983575</a:t>
-            </a:r>
-          </a:p>
-          <a:p>
-            <a:pPr marL="0" indent="0">
-              <a:buNone/>
-            </a:pPr>
-            <a:r>
-              <a:rPr lang="en-US" dirty="0"/>
-              <a:t>[2]	Dong, Z. </a:t>
-            </a:r>
-            <a:r>
-              <a:rPr lang="en-US" i="1" dirty="0"/>
-              <a:t>et al.</a:t>
-            </a:r>
-            <a:r>
-              <a:rPr lang="en-US" dirty="0"/>
-              <a:t> Convolutional Neural Networks Based on RRAM Devices for Image Recognition and Online Learning Tasks. </a:t>
-            </a:r>
-            <a:r>
-              <a:rPr lang="en-US" i="1" dirty="0"/>
-              <a:t>IEEE Transactions on Electron Devices</a:t>
-            </a:r>
-            <a:r>
-              <a:rPr lang="en-US" dirty="0"/>
-              <a:t> </a:t>
-            </a:r>
-            <a:r>
-              <a:rPr lang="en-US" b="1" dirty="0"/>
-              <a:t>66,</a:t>
-            </a:r>
-            <a:r>
-              <a:rPr lang="en-US" dirty="0"/>
-              <a:t> 793–801 (2019).</a:t>
-            </a:r>
-          </a:p>
-          <a:p>
-            <a:pPr marL="0" indent="0">
-              <a:buNone/>
-            </a:pPr>
-            <a:r>
-              <a:rPr lang="en-US" dirty="0"/>
-              <a:t>[3] 	Soloviev, R., </a:t>
-            </a:r>
-            <a:r>
-              <a:rPr lang="en-US" dirty="0" err="1"/>
-              <a:t>Telpukhov</a:t>
-            </a:r>
-            <a:r>
-              <a:rPr lang="en-US" dirty="0"/>
-              <a:t>, D., </a:t>
-            </a:r>
-            <a:r>
-              <a:rPr lang="en-US" dirty="0" err="1"/>
-              <a:t>Mkrtchan</a:t>
-            </a:r>
-            <a:r>
-              <a:rPr lang="en-US" dirty="0"/>
-              <a:t>, I., </a:t>
-            </a:r>
-            <a:r>
-              <a:rPr lang="en-US" dirty="0" err="1"/>
-              <a:t>Kustov</a:t>
-            </a:r>
-            <a:r>
-              <a:rPr lang="en-US" dirty="0"/>
-              <a:t>, A. &amp; </a:t>
-            </a:r>
-            <a:r>
-              <a:rPr lang="en-US" dirty="0" err="1"/>
-              <a:t>Stempkovskiy</a:t>
-            </a:r>
-            <a:r>
-              <a:rPr lang="en-US" dirty="0"/>
-              <a:t>, A. Hardware Implementation of Convolutional Neural Networks Based on Residue Number System. in </a:t>
-            </a:r>
-            <a:r>
-              <a:rPr lang="en-US" i="1" dirty="0"/>
-              <a:t>Moscow Workshop on Electronic and Networking Technologies, MWENT 2020 - Proceedings</a:t>
-            </a:r>
-            <a:r>
-              <a:rPr lang="en-US" dirty="0"/>
-              <a:t> (Institute of Electrical and Electronics Engineers Inc., 2020). doi:10.1109/MWENT47943.2020.9067498</a:t>
-            </a:r>
-          </a:p>
-          <a:p>
-            <a:pPr marL="0" indent="0">
-              <a:buNone/>
-            </a:pPr>
-            <a:r>
-              <a:rPr lang="en-US" dirty="0"/>
-              <a:t>[4]	Park, B., </a:t>
-            </a:r>
-            <a:r>
-              <a:rPr lang="en-US" dirty="0" err="1"/>
-              <a:t>Ishiwara</a:t>
-            </a:r>
-            <a:r>
-              <a:rPr lang="en-US" dirty="0"/>
-              <a:t>, H., </a:t>
-            </a:r>
-            <a:r>
-              <a:rPr lang="en-US" dirty="0" err="1"/>
-              <a:t>Okuyama</a:t>
-            </a:r>
-            <a:r>
-              <a:rPr lang="en-US" dirty="0"/>
-              <a:t>, M., Sakai, S., Yoon, S. Ferroelectric-Gate Field Effect Transistor Memories Device Physics and Applications. in </a:t>
-            </a:r>
-            <a:r>
-              <a:rPr lang="en-US" i="1" dirty="0"/>
-              <a:t>Topics in Applied Physics</a:t>
-            </a:r>
-            <a:r>
-              <a:rPr lang="en-US" dirty="0"/>
-              <a:t> </a:t>
-            </a:r>
-            <a:r>
-              <a:rPr lang="en-US" b="1" dirty="0"/>
-              <a:t>131</a:t>
-            </a:r>
-            <a:r>
-              <a:rPr lang="en-US" dirty="0"/>
-              <a:t>, (2020).</a:t>
-            </a:r>
-          </a:p>
-          <a:p>
-            <a:pPr marL="0" indent="0">
-              <a:buNone/>
-            </a:pPr>
-            <a:r>
-              <a:rPr lang="en-US" dirty="0"/>
-              <a:t>[5]	</a:t>
-            </a:r>
-            <a:r>
-              <a:rPr lang="en-US" dirty="0" err="1"/>
-              <a:t>Valueva</a:t>
-            </a:r>
-            <a:r>
-              <a:rPr lang="en-US" dirty="0"/>
-              <a:t>, M. V., </a:t>
-            </a:r>
-            <a:r>
-              <a:rPr lang="en-US" dirty="0" err="1"/>
-              <a:t>Nagornov</a:t>
-            </a:r>
-            <a:r>
-              <a:rPr lang="en-US" dirty="0"/>
-              <a:t>, N. N., </a:t>
-            </a:r>
-            <a:r>
-              <a:rPr lang="en-US" dirty="0" err="1"/>
-              <a:t>Lyakhov</a:t>
-            </a:r>
-            <a:r>
-              <a:rPr lang="en-US" dirty="0"/>
-              <a:t>, P. A., </a:t>
-            </a:r>
-            <a:r>
-              <a:rPr lang="en-US" dirty="0" err="1"/>
-              <a:t>Valuev</a:t>
-            </a:r>
-            <a:r>
-              <a:rPr lang="en-US" dirty="0"/>
-              <a:t>, G. V. &amp; </a:t>
-            </a:r>
-            <a:r>
-              <a:rPr lang="en-US" dirty="0" err="1"/>
-              <a:t>Chervyakov</a:t>
-            </a:r>
-            <a:r>
-              <a:rPr lang="en-US" dirty="0"/>
-              <a:t>, N. I. Application of the residue number system to reduce hardware costs of the convolutional neural network implementation. </a:t>
-            </a:r>
-            <a:r>
-              <a:rPr lang="en-US" i="1" dirty="0"/>
-              <a:t>Mathematics and Computers in Simulation</a:t>
-            </a:r>
-            <a:r>
-              <a:rPr lang="en-US" dirty="0"/>
-              <a:t> </a:t>
-            </a:r>
-            <a:r>
-              <a:rPr lang="en-US" b="1" dirty="0"/>
-              <a:t>177,</a:t>
-            </a:r>
-            <a:r>
-              <a:rPr lang="en-US" dirty="0"/>
-              <a:t> 232–243 (2020).</a:t>
-            </a:r>
-            <a:endParaRPr lang="en-US" i="1" dirty="0"/>
-          </a:p>
-          <a:p>
-            <a:pPr marL="0" indent="0">
-              <a:buNone/>
-            </a:pPr>
-            <a:r>
-              <a:rPr lang="en-US" dirty="0"/>
-              <a:t>[6]	 Chung, J., Choi, W., Park, J. &amp; Ghosh, S. Domain Wall Memory-Based Design of Deep Neural Network Convolutional Layers. </a:t>
-            </a:r>
-            <a:r>
-              <a:rPr lang="en-US" i="1" dirty="0"/>
-              <a:t>IEEE Access</a:t>
-            </a:r>
-            <a:r>
-              <a:rPr lang="en-US" dirty="0"/>
-              <a:t> </a:t>
-            </a:r>
-            <a:r>
-              <a:rPr lang="en-US" b="1" dirty="0"/>
-              <a:t>8,</a:t>
-            </a:r>
-            <a:r>
-              <a:rPr lang="en-US" dirty="0"/>
-              <a:t> 19783–19798 (2020).</a:t>
-            </a:r>
-          </a:p>
-          <a:p>
-            <a:pPr marL="0" indent="0">
-              <a:buNone/>
-            </a:pPr>
-            <a:r>
-              <a:rPr lang="en-US" dirty="0"/>
-              <a:t>[7]	 Yao, P. </a:t>
-            </a:r>
-            <a:r>
-              <a:rPr lang="en-US" i="1" dirty="0"/>
-              <a:t>et al.</a:t>
-            </a:r>
-            <a:r>
-              <a:rPr lang="en-US" dirty="0"/>
-              <a:t> Fully hardware-implemented memristor convolutional neural network. </a:t>
-            </a:r>
-            <a:r>
-              <a:rPr lang="en-US" i="1" dirty="0"/>
-              <a:t>Nature</a:t>
-            </a:r>
-            <a:r>
-              <a:rPr lang="en-US" dirty="0"/>
-              <a:t> </a:t>
-            </a:r>
-            <a:r>
-              <a:rPr lang="en-US" b="1" dirty="0"/>
-              <a:t>577,</a:t>
-            </a:r>
-            <a:r>
-              <a:rPr lang="en-US" dirty="0"/>
-              <a:t> 641–646 (2020).</a:t>
-            </a:r>
-          </a:p>
-          <a:p>
-            <a:pPr marL="0" indent="0">
-              <a:buNone/>
-            </a:pPr>
-            <a:r>
-              <a:rPr lang="en-US" dirty="0"/>
-              <a:t>[8]	 Gong, L., Wang, C., Li, X., Chen, H. &amp; Zhou, X. MALOC: A fully pipelined FPGA accelerator for convolutional neural networks with all layers mapped on chip. </a:t>
-            </a:r>
-            <a:r>
-              <a:rPr lang="en-US" i="1" dirty="0"/>
-              <a:t>IEEE Transactions on Computer-Aided Design of Integrated Circuits and Systems</a:t>
-            </a:r>
-            <a:r>
-              <a:rPr lang="en-US" dirty="0"/>
-              <a:t> </a:t>
-            </a:r>
-            <a:r>
-              <a:rPr lang="en-US" b="1" dirty="0"/>
-              <a:t>37,</a:t>
-            </a:r>
-            <a:r>
-              <a:rPr lang="en-US" dirty="0"/>
-              <a:t> 2601–2612 (2018).</a:t>
-            </a:r>
-          </a:p>
-          <a:p>
-            <a:pPr marL="0" indent="0">
-              <a:buNone/>
-            </a:pPr>
-            <a:r>
-              <a:rPr lang="en-US" dirty="0"/>
-              <a:t>[9]	 </a:t>
-            </a:r>
-            <a:r>
-              <a:rPr lang="en-US" dirty="0" err="1"/>
-              <a:t>Solovyev</a:t>
-            </a:r>
-            <a:r>
-              <a:rPr lang="en-US" dirty="0"/>
-              <a:t>, R. A., </a:t>
-            </a:r>
-            <a:r>
-              <a:rPr lang="en-US" dirty="0" err="1"/>
-              <a:t>Stempkovsky</a:t>
-            </a:r>
-            <a:r>
-              <a:rPr lang="en-US" dirty="0"/>
-              <a:t>, A. L. &amp; </a:t>
-            </a:r>
-            <a:r>
-              <a:rPr lang="en-US" dirty="0" err="1"/>
-              <a:t>Telpukhov</a:t>
-            </a:r>
-            <a:r>
-              <a:rPr lang="en-US" dirty="0"/>
-              <a:t>, D. V. Study of Fault Tolerance Methods for Hardware Implementations of Convolutional Neural Networks. </a:t>
-            </a:r>
-            <a:r>
-              <a:rPr lang="en-US" i="1" dirty="0"/>
-              <a:t>Optical Memory and Neural Networks (Information Optics)</a:t>
-            </a:r>
-            <a:r>
-              <a:rPr lang="en-US" dirty="0"/>
-              <a:t> </a:t>
-            </a:r>
-            <a:r>
-              <a:rPr lang="en-US" b="1" dirty="0"/>
-              <a:t>28,</a:t>
-            </a:r>
-            <a:r>
-              <a:rPr lang="en-US" dirty="0"/>
-              <a:t> 82–88 (2019).</a:t>
-            </a:r>
-          </a:p>
-          <a:p>
-            <a:pPr marL="0" indent="0">
-              <a:buNone/>
-            </a:pPr>
-            <a:r>
-              <a:rPr lang="en-US" dirty="0"/>
-              <a:t>[10]	 </a:t>
-            </a:r>
-            <a:r>
-              <a:rPr lang="en-US" dirty="0" err="1"/>
-              <a:t>Hacene</a:t>
-            </a:r>
-            <a:r>
-              <a:rPr lang="en-US" dirty="0"/>
-              <a:t>, G. B., </a:t>
-            </a:r>
-            <a:r>
-              <a:rPr lang="en-US" dirty="0" err="1"/>
-              <a:t>Gripon</a:t>
-            </a:r>
-            <a:r>
-              <a:rPr lang="en-US" dirty="0"/>
-              <a:t>, V., </a:t>
-            </a:r>
-            <a:r>
-              <a:rPr lang="en-US" dirty="0" err="1"/>
-              <a:t>Arzel</a:t>
-            </a:r>
-            <a:r>
-              <a:rPr lang="en-US" dirty="0"/>
-              <a:t>, M., Farrugia, N. &amp; </a:t>
-            </a:r>
-            <a:r>
-              <a:rPr lang="en-US" dirty="0" err="1"/>
-              <a:t>Bengio</a:t>
-            </a:r>
-            <a:r>
-              <a:rPr lang="en-US" dirty="0"/>
-              <a:t>, Y. Quantized guided pruning for efficient hardware implementations of deep neural networks. in </a:t>
-            </a:r>
-            <a:r>
-              <a:rPr lang="en-US" i="1" dirty="0"/>
-              <a:t>NEWCAS 2020 - 18th IEEE International New Circuits and Systems Conference, Proceedings</a:t>
-            </a:r>
-            <a:r>
-              <a:rPr lang="en-US" dirty="0"/>
-              <a:t> 206–209 (Institute of Electrical and Electronics Engineers Inc., 2020). doi:10.1109/NEWCAS49341.2020.9159769</a:t>
-            </a:r>
-          </a:p>
-          <a:p>
-            <a:pPr marL="0" indent="0">
-              <a:buNone/>
-            </a:pPr>
-            <a:r>
-              <a:rPr lang="en-US" dirty="0"/>
-              <a:t>[11]	 </a:t>
-            </a:r>
-            <a:r>
-              <a:rPr lang="en-US" dirty="0" err="1"/>
-              <a:t>Gysel</a:t>
-            </a:r>
-            <a:r>
-              <a:rPr lang="en-US" dirty="0"/>
-              <a:t>, P. Ristretto: Hardware-Oriented Approximation of Convolutional Neural Networks. (2016).</a:t>
-            </a:r>
-          </a:p>
-          <a:p>
-            <a:pPr marL="0" indent="0">
-              <a:buNone/>
-            </a:pPr>
-            <a:r>
-              <a:rPr lang="en-US" dirty="0"/>
-              <a:t>[12]	 Chen, W., Wang, Y., Yang, C. &amp; Li, Y. Hardware acceleration implementation of three-dimensional convolutional neural network on vector digital signal processors. in </a:t>
-            </a:r>
-            <a:r>
-              <a:rPr lang="en-US" i="1" dirty="0"/>
-              <a:t>2020 4th International Conference on Robotics and Automation Sciences, ICRAS 2020</a:t>
-            </a:r>
-            <a:r>
-              <a:rPr lang="en-US" dirty="0"/>
-              <a:t> 122–129 (Institute of Electrical and Electronics Engineers Inc., 2020). doi:10.1109/ICRAS49812.2020.9135062</a:t>
-            </a:r>
-          </a:p>
-          <a:p>
-            <a:pPr marL="0" indent="0">
-              <a:buNone/>
-            </a:pPr>
-            <a:r>
-              <a:rPr lang="en-US" dirty="0"/>
-              <a:t>[13]	Long, Y., Na, T., Rastogi, P., Rao, K., Khan, A., </a:t>
-            </a:r>
-            <a:r>
-              <a:rPr lang="en-US" dirty="0" err="1"/>
-              <a:t>Yalamanchili</a:t>
-            </a:r>
-            <a:r>
-              <a:rPr lang="en-US" dirty="0"/>
-              <a:t>, S., Mukhopadhyay, S. A ferroelectric FET based power-efficient architecture for data-intensive computing. </a:t>
-            </a:r>
-            <a:r>
-              <a:rPr lang="en-US" i="1" dirty="0"/>
-              <a:t>IEEE/ACM International Conference on Computer-Aided Design, Digest of Technical Papers, ICCAD</a:t>
-            </a:r>
-            <a:r>
-              <a:rPr lang="en-US" dirty="0"/>
-              <a:t>, (2018). doi:10.1145/3240765.3240770</a:t>
-            </a:r>
-          </a:p>
-          <a:p>
-            <a:pPr marL="0" indent="0">
-              <a:buNone/>
-            </a:pPr>
-            <a:r>
-              <a:rPr lang="en-US" dirty="0"/>
-              <a:t>[14] 	Long, Y., Kim, D., Lee, E., </a:t>
-            </a:r>
-            <a:r>
-              <a:rPr lang="en-US" dirty="0" err="1"/>
-              <a:t>Saha</a:t>
-            </a:r>
-            <a:r>
-              <a:rPr lang="en-US" dirty="0"/>
-              <a:t>, P., Mudassar, Burhan A., She, X., Khan, A., Mukhopadhyay, S. </a:t>
-            </a:r>
-            <a:r>
-              <a:rPr lang="en-US" dirty="0">
-                <a:effectLst/>
-              </a:rPr>
-              <a:t>A Ferroelectric FET-Based Processing-in-Memory Architecture for DNN Acceleration. </a:t>
-            </a:r>
-            <a:r>
-              <a:rPr lang="en-US" i="1" dirty="0">
-                <a:effectLst/>
-              </a:rPr>
-              <a:t>IEEE Journal on Exploratory Solid-State Computational Devices and Circuits</a:t>
-            </a:r>
-            <a:r>
-              <a:rPr lang="en-US" i="1" dirty="0"/>
-              <a:t>, </a:t>
-            </a:r>
-            <a:r>
-              <a:rPr lang="en-US" b="1" dirty="0"/>
-              <a:t>5</a:t>
-            </a:r>
-            <a:r>
-              <a:rPr lang="en-US" dirty="0"/>
-              <a:t>, 2, 113-122 (2019). </a:t>
-            </a:r>
-            <a:r>
-              <a:rPr lang="en-US" dirty="0" err="1"/>
-              <a:t>doi</a:t>
-            </a:r>
-            <a:r>
-              <a:rPr lang="en-US" dirty="0"/>
-              <a:t>: 10.1109/JXCDC.2019.2923745</a:t>
-            </a:r>
-          </a:p>
-          <a:p>
-            <a:pPr marL="0" indent="0">
-              <a:buNone/>
-            </a:pPr>
-            <a:r>
-              <a:rPr lang="en-US" dirty="0"/>
-              <a:t>[15]</a:t>
-            </a:r>
-            <a:r>
-              <a:rPr lang="en-US" dirty="0">
-                <a:effectLst/>
-              </a:rPr>
-              <a:t> 	Long, Y., Lee, E., Kim, D., Mukhopadhyay, S. Flex-PIM: A Ferroelectric FET based Vector Matrix Multiplication Engine with Dynamical </a:t>
-            </a:r>
-            <a:r>
-              <a:rPr lang="en-US" dirty="0" err="1">
-                <a:effectLst/>
-              </a:rPr>
-              <a:t>Bitwidth</a:t>
-            </a:r>
-            <a:r>
-              <a:rPr lang="en-US" dirty="0">
-                <a:effectLst/>
-              </a:rPr>
-              <a:t> and Floating Point Precision. </a:t>
-            </a:r>
-            <a:r>
-              <a:rPr lang="en-US" i="1" dirty="0">
-                <a:effectLst/>
-              </a:rPr>
-              <a:t>Proceedings of the International Joint Conference on Neural Networks</a:t>
-            </a:r>
-            <a:r>
-              <a:rPr lang="en-US" dirty="0">
-                <a:effectLst/>
-              </a:rPr>
-              <a:t> (2020). </a:t>
-            </a:r>
-            <a:r>
-              <a:rPr lang="en-US" dirty="0" err="1"/>
-              <a:t>doi</a:t>
-            </a:r>
-            <a:r>
-              <a:rPr lang="en-US" dirty="0"/>
-              <a:t>: 10.1109/IJCNN48605.2020.9206672.</a:t>
-            </a:r>
-          </a:p>
-          <a:p>
-            <a:pPr marL="0" indent="0">
-              <a:buNone/>
-            </a:pPr>
-            <a:r>
-              <a:rPr lang="en-US" dirty="0"/>
-              <a:t>[16] 	Shalini, Kumar, A., </a:t>
-            </a:r>
-            <a:r>
-              <a:rPr lang="en-US" dirty="0">
-                <a:effectLst/>
-              </a:rPr>
-              <a:t>Design Of High Speed And Low Power Sense Amplifier for SRAM Applications. </a:t>
-            </a:r>
-            <a:r>
-              <a:rPr lang="en-US" i="1" dirty="0">
-                <a:effectLst/>
-              </a:rPr>
-              <a:t>International Journal of Scientific &amp; Engineering Research</a:t>
-            </a:r>
-            <a:r>
-              <a:rPr lang="en-US" dirty="0"/>
-              <a:t>. </a:t>
-            </a:r>
-            <a:r>
-              <a:rPr lang="en-US" b="1" dirty="0"/>
-              <a:t>4</a:t>
-            </a:r>
-            <a:r>
-              <a:rPr lang="en-US" dirty="0"/>
-              <a:t>, 7, 402-406 (2013).</a:t>
-            </a:r>
-          </a:p>
-          <a:p>
-            <a:pPr marL="0" indent="0">
-              <a:buNone/>
-            </a:pPr>
-            <a:r>
-              <a:rPr lang="en-US" dirty="0"/>
-              <a:t>[17]	</a:t>
-            </a:r>
-            <a:r>
-              <a:rPr lang="en-US" dirty="0" err="1"/>
-              <a:t>Okobiah</a:t>
-            </a:r>
-            <a:r>
-              <a:rPr lang="en-US" dirty="0"/>
-              <a:t>, O., Mohanty, S.P., </a:t>
-            </a:r>
-            <a:r>
-              <a:rPr lang="en-US" dirty="0" err="1"/>
-              <a:t>Kougianos</a:t>
-            </a:r>
-            <a:r>
-              <a:rPr lang="en-US" dirty="0"/>
-              <a:t>, E., </a:t>
-            </a:r>
-            <a:r>
-              <a:rPr lang="en-US" dirty="0" err="1"/>
-              <a:t>Poolakkaparambil</a:t>
-            </a:r>
-            <a:r>
-              <a:rPr lang="en-US" dirty="0"/>
-              <a:t>, M. Towards Robust Nano-CMOS Sense Amplifier Design: A Dual-Threshold versus Dual-Oxide Perspective in </a:t>
-            </a:r>
-            <a:r>
-              <a:rPr lang="en-US" i="1" dirty="0">
-                <a:effectLst/>
-              </a:rPr>
-              <a:t>ACM Great Lakes Symposium on VLSI, GLSVLSI, Proceedings</a:t>
-            </a:r>
-            <a:r>
-              <a:rPr lang="en-US" dirty="0">
-                <a:effectLst/>
-              </a:rPr>
-              <a:t> 145-150 (2011).</a:t>
-            </a:r>
-            <a:endParaRPr lang="en-US" dirty="0"/>
-          </a:p>
-        </p:txBody>
-      </p:sp>
-    </p:spTree>
-    <p:extLst>
-      <p:ext uri="{BB962C8B-B14F-4D97-AF65-F5344CB8AC3E}">
-        <p14:creationId xmlns:p14="http://schemas.microsoft.com/office/powerpoint/2010/main" val="231561457"/>
       </p:ext>
     </p:extLst>
   </p:cSld>
@@ -4722,7 +4005,7 @@
           <a:noFill/>
           <a:ln w="38100">
             <a:solidFill>
-              <a:schemeClr val="tx1"/>
+              <a:srgbClr val="FFC000"/>
             </a:solidFill>
           </a:ln>
           <a:effectLst/>
@@ -4933,7 +4216,7 @@
           <a:noFill/>
           <a:ln w="38100">
             <a:solidFill>
-              <a:schemeClr val="tx1"/>
+              <a:srgbClr val="FFC000"/>
             </a:solidFill>
           </a:ln>
           <a:effectLst/>
@@ -5723,13 +5006,20 @@
         </p:spPr>
         <p:txBody>
           <a:bodyPr>
-            <a:normAutofit fontScale="70000" lnSpcReduction="20000"/>
+            <a:normAutofit fontScale="62500" lnSpcReduction="20000"/>
           </a:bodyPr>
           <a:lstStyle/>
           <a:p>
             <a:r>
               <a:rPr lang="en-US" dirty="0"/>
               <a:t>Input encoding</a:t>
+            </a:r>
+          </a:p>
+          <a:p>
+            <a:pPr lvl="1"/>
+            <a:r>
+              <a:rPr lang="en-US" dirty="0"/>
+              <a:t>No changes here since last update</a:t>
             </a:r>
           </a:p>
           <a:p>
@@ -12346,14 +11636,14 @@
           <p:nvPr>
             <p:extLst>
               <p:ext uri="{D42A27DB-BD31-4B8C-83A1-F6EECF244321}">
-                <p14:modId xmlns:p14="http://schemas.microsoft.com/office/powerpoint/2010/main" val="3234068858"/>
+                <p14:modId xmlns:p14="http://schemas.microsoft.com/office/powerpoint/2010/main" val="3016393144"/>
               </p:ext>
             </p:extLst>
           </p:nvPr>
         </p:nvGraphicFramePr>
         <p:xfrm>
-          <a:off x="2385024" y="4240396"/>
-          <a:ext cx="4155517" cy="1645920"/>
+          <a:off x="2178412" y="4283504"/>
+          <a:ext cx="4749548" cy="1280160"/>
         </p:xfrm>
         <a:graphic>
           <a:graphicData uri="http://schemas.openxmlformats.org/drawingml/2006/table">
@@ -12362,42 +11652,42 @@
                 <a:tableStyleId>{5C22544A-7EE6-4342-B048-85BDC9FD1C3A}</a:tableStyleId>
               </a:tblPr>
               <a:tblGrid>
-                <a:gridCol w="709526">
+                <a:gridCol w="810953">
                   <a:extLst>
                     <a:ext uri="{9D8B030D-6E8A-4147-A177-3AD203B41FA5}">
                       <a16:colId xmlns:a16="http://schemas.microsoft.com/office/drawing/2014/main" val="2016579060"/>
                     </a:ext>
                   </a:extLst>
                 </a:gridCol>
-                <a:gridCol w="709526">
+                <a:gridCol w="810953">
                   <a:extLst>
                     <a:ext uri="{9D8B030D-6E8A-4147-A177-3AD203B41FA5}">
                       <a16:colId xmlns:a16="http://schemas.microsoft.com/office/drawing/2014/main" val="3446345407"/>
                     </a:ext>
                   </a:extLst>
                 </a:gridCol>
-                <a:gridCol w="709526">
+                <a:gridCol w="810953">
                   <a:extLst>
                     <a:ext uri="{9D8B030D-6E8A-4147-A177-3AD203B41FA5}">
                       <a16:colId xmlns:a16="http://schemas.microsoft.com/office/drawing/2014/main" val="416883943"/>
                     </a:ext>
                   </a:extLst>
                 </a:gridCol>
-                <a:gridCol w="607887">
+                <a:gridCol w="694784">
                   <a:extLst>
                     <a:ext uri="{9D8B030D-6E8A-4147-A177-3AD203B41FA5}">
                       <a16:colId xmlns:a16="http://schemas.microsoft.com/office/drawing/2014/main" val="2213567876"/>
                     </a:ext>
                   </a:extLst>
                 </a:gridCol>
-                <a:gridCol w="607887">
+                <a:gridCol w="694784">
                   <a:extLst>
                     <a:ext uri="{9D8B030D-6E8A-4147-A177-3AD203B41FA5}">
                       <a16:colId xmlns:a16="http://schemas.microsoft.com/office/drawing/2014/main" val="2270745288"/>
                     </a:ext>
                   </a:extLst>
                 </a:gridCol>
-                <a:gridCol w="811165">
+                <a:gridCol w="927121">
                   <a:extLst>
                     <a:ext uri="{9D8B030D-6E8A-4147-A177-3AD203B41FA5}">
                       <a16:colId xmlns:a16="http://schemas.microsoft.com/office/drawing/2014/main" val="2612166611"/>
@@ -12405,331 +11695,6 @@
                   </a:extLst>
                 </a:gridCol>
               </a:tblGrid>
-              <a:tr h="336579">
-                <a:tc>
-                  <a:txBody>
-                    <a:bodyPr/>
-                    <a:lstStyle/>
-                    <a:p>
-                      <a:pPr algn="ctr"/>
-                      <a:endParaRPr lang="en-US" b="0" baseline="0" dirty="0">
-                        <a:solidFill>
-                          <a:schemeClr val="tx1"/>
-                        </a:solidFill>
-                      </a:endParaRPr>
-                    </a:p>
-                  </a:txBody>
-                  <a:tcPr>
-                    <a:lnL w="12700" cap="flat" cmpd="sng" algn="ctr">
-                      <a:solidFill>
-                        <a:schemeClr val="tx1"/>
-                      </a:solidFill>
-                      <a:prstDash val="solid"/>
-                      <a:round/>
-                      <a:headEnd type="none" w="med" len="med"/>
-                      <a:tailEnd type="none" w="med" len="med"/>
-                    </a:lnL>
-                    <a:lnR w="12700" cap="flat" cmpd="sng" algn="ctr">
-                      <a:solidFill>
-                        <a:schemeClr val="tx1"/>
-                      </a:solidFill>
-                      <a:prstDash val="solid"/>
-                      <a:round/>
-                      <a:headEnd type="none" w="med" len="med"/>
-                      <a:tailEnd type="none" w="med" len="med"/>
-                    </a:lnR>
-                    <a:lnT w="12700" cap="flat" cmpd="sng" algn="ctr">
-                      <a:solidFill>
-                        <a:schemeClr val="tx1"/>
-                      </a:solidFill>
-                      <a:prstDash val="solid"/>
-                      <a:round/>
-                      <a:headEnd type="none" w="med" len="med"/>
-                      <a:tailEnd type="none" w="med" len="med"/>
-                    </a:lnT>
-                    <a:lnB w="12700" cap="flat" cmpd="sng" algn="ctr">
-                      <a:solidFill>
-                        <a:schemeClr val="tx1"/>
-                      </a:solidFill>
-                      <a:prstDash val="solid"/>
-                      <a:round/>
-                      <a:headEnd type="none" w="med" len="med"/>
-                      <a:tailEnd type="none" w="med" len="med"/>
-                    </a:lnB>
-                    <a:noFill/>
-                  </a:tcPr>
-                </a:tc>
-                <a:tc>
-                  <a:txBody>
-                    <a:bodyPr/>
-                    <a:lstStyle/>
-                    <a:p>
-                      <a:pPr algn="ctr"/>
-                      <a:endParaRPr lang="en-US" b="0" baseline="-25000" dirty="0">
-                        <a:solidFill>
-                          <a:schemeClr val="tx1"/>
-                        </a:solidFill>
-                      </a:endParaRPr>
-                    </a:p>
-                  </a:txBody>
-                  <a:tcPr>
-                    <a:lnL w="12700" cap="flat" cmpd="sng" algn="ctr">
-                      <a:solidFill>
-                        <a:schemeClr val="tx1"/>
-                      </a:solidFill>
-                      <a:prstDash val="solid"/>
-                      <a:round/>
-                      <a:headEnd type="none" w="med" len="med"/>
-                      <a:tailEnd type="none" w="med" len="med"/>
-                    </a:lnL>
-                    <a:lnR w="12700" cap="flat" cmpd="sng" algn="ctr">
-                      <a:solidFill>
-                        <a:schemeClr val="tx1"/>
-                      </a:solidFill>
-                      <a:prstDash val="solid"/>
-                      <a:round/>
-                      <a:headEnd type="none" w="med" len="med"/>
-                      <a:tailEnd type="none" w="med" len="med"/>
-                    </a:lnR>
-                    <a:lnT w="12700" cap="flat" cmpd="sng" algn="ctr">
-                      <a:solidFill>
-                        <a:schemeClr val="tx1"/>
-                      </a:solidFill>
-                      <a:prstDash val="solid"/>
-                      <a:round/>
-                      <a:headEnd type="none" w="med" len="med"/>
-                      <a:tailEnd type="none" w="med" len="med"/>
-                    </a:lnT>
-                    <a:lnB w="12700" cap="flat" cmpd="sng" algn="ctr">
-                      <a:solidFill>
-                        <a:schemeClr val="tx1"/>
-                      </a:solidFill>
-                      <a:prstDash val="solid"/>
-                      <a:round/>
-                      <a:headEnd type="none" w="med" len="med"/>
-                      <a:tailEnd type="none" w="med" len="med"/>
-                    </a:lnB>
-                    <a:noFill/>
-                  </a:tcPr>
-                </a:tc>
-                <a:tc>
-                  <a:txBody>
-                    <a:bodyPr/>
-                    <a:lstStyle/>
-                    <a:p>
-                      <a:pPr algn="ctr"/>
-                      <a:endParaRPr lang="en-US" b="0" baseline="-25000" dirty="0">
-                        <a:solidFill>
-                          <a:schemeClr val="tx1"/>
-                        </a:solidFill>
-                      </a:endParaRPr>
-                    </a:p>
-                  </a:txBody>
-                  <a:tcPr>
-                    <a:lnL w="12700" cap="flat" cmpd="sng" algn="ctr">
-                      <a:solidFill>
-                        <a:schemeClr val="tx1"/>
-                      </a:solidFill>
-                      <a:prstDash val="solid"/>
-                      <a:round/>
-                      <a:headEnd type="none" w="med" len="med"/>
-                      <a:tailEnd type="none" w="med" len="med"/>
-                    </a:lnL>
-                    <a:lnR w="12700" cap="flat" cmpd="sng" algn="ctr">
-                      <a:solidFill>
-                        <a:schemeClr val="tx1"/>
-                      </a:solidFill>
-                      <a:prstDash val="solid"/>
-                      <a:round/>
-                      <a:headEnd type="none" w="med" len="med"/>
-                      <a:tailEnd type="none" w="med" len="med"/>
-                    </a:lnR>
-                    <a:lnT w="12700" cap="flat" cmpd="sng" algn="ctr">
-                      <a:solidFill>
-                        <a:schemeClr val="tx1"/>
-                      </a:solidFill>
-                      <a:prstDash val="solid"/>
-                      <a:round/>
-                      <a:headEnd type="none" w="med" len="med"/>
-                      <a:tailEnd type="none" w="med" len="med"/>
-                    </a:lnT>
-                    <a:lnB w="12700" cap="flat" cmpd="sng" algn="ctr">
-                      <a:solidFill>
-                        <a:schemeClr val="tx1"/>
-                      </a:solidFill>
-                      <a:prstDash val="solid"/>
-                      <a:round/>
-                      <a:headEnd type="none" w="med" len="med"/>
-                      <a:tailEnd type="none" w="med" len="med"/>
-                    </a:lnB>
-                    <a:noFill/>
-                  </a:tcPr>
-                </a:tc>
-                <a:tc>
-                  <a:txBody>
-                    <a:bodyPr/>
-                    <a:lstStyle/>
-                    <a:p>
-                      <a:pPr algn="ctr"/>
-                      <a:endParaRPr lang="en-US" b="0" baseline="-25000" dirty="0">
-                        <a:solidFill>
-                          <a:schemeClr val="tx1"/>
-                        </a:solidFill>
-                      </a:endParaRPr>
-                    </a:p>
-                  </a:txBody>
-                  <a:tcPr>
-                    <a:lnL w="12700" cap="flat" cmpd="sng" algn="ctr">
-                      <a:solidFill>
-                        <a:schemeClr val="tx1"/>
-                      </a:solidFill>
-                      <a:prstDash val="solid"/>
-                      <a:round/>
-                      <a:headEnd type="none" w="med" len="med"/>
-                      <a:tailEnd type="none" w="med" len="med"/>
-                    </a:lnL>
-                    <a:lnR w="12700" cap="flat" cmpd="sng" algn="ctr">
-                      <a:solidFill>
-                        <a:schemeClr val="tx1"/>
-                      </a:solidFill>
-                      <a:prstDash val="solid"/>
-                      <a:round/>
-                      <a:headEnd type="none" w="med" len="med"/>
-                      <a:tailEnd type="none" w="med" len="med"/>
-                    </a:lnR>
-                    <a:lnT w="12700" cap="flat" cmpd="sng" algn="ctr">
-                      <a:solidFill>
-                        <a:schemeClr val="tx1"/>
-                      </a:solidFill>
-                      <a:prstDash val="solid"/>
-                      <a:round/>
-                      <a:headEnd type="none" w="med" len="med"/>
-                      <a:tailEnd type="none" w="med" len="med"/>
-                    </a:lnT>
-                    <a:lnB w="12700" cap="flat" cmpd="sng" algn="ctr">
-                      <a:solidFill>
-                        <a:schemeClr val="tx1"/>
-                      </a:solidFill>
-                      <a:prstDash val="solid"/>
-                      <a:round/>
-                      <a:headEnd type="none" w="med" len="med"/>
-                      <a:tailEnd type="none" w="med" len="med"/>
-                    </a:lnB>
-                    <a:noFill/>
-                  </a:tcPr>
-                </a:tc>
-                <a:tc>
-                  <a:txBody>
-                    <a:bodyPr/>
-                    <a:lstStyle/>
-                    <a:p>
-                      <a:pPr algn="ctr"/>
-                      <a:endParaRPr lang="en-US" b="0" baseline="-25000" dirty="0">
-                        <a:solidFill>
-                          <a:schemeClr val="tx1"/>
-                        </a:solidFill>
-                      </a:endParaRPr>
-                    </a:p>
-                  </a:txBody>
-                  <a:tcPr>
-                    <a:lnL w="12700" cap="flat" cmpd="sng" algn="ctr">
-                      <a:solidFill>
-                        <a:schemeClr val="tx1"/>
-                      </a:solidFill>
-                      <a:prstDash val="solid"/>
-                      <a:round/>
-                      <a:headEnd type="none" w="med" len="med"/>
-                      <a:tailEnd type="none" w="med" len="med"/>
-                    </a:lnL>
-                    <a:lnR w="12700" cap="flat" cmpd="sng" algn="ctr">
-                      <a:solidFill>
-                        <a:schemeClr val="tx1"/>
-                      </a:solidFill>
-                      <a:prstDash val="solid"/>
-                      <a:round/>
-                      <a:headEnd type="none" w="med" len="med"/>
-                      <a:tailEnd type="none" w="med" len="med"/>
-                    </a:lnR>
-                    <a:lnT w="12700" cap="flat" cmpd="sng" algn="ctr">
-                      <a:solidFill>
-                        <a:schemeClr val="tx1"/>
-                      </a:solidFill>
-                      <a:prstDash val="solid"/>
-                      <a:round/>
-                      <a:headEnd type="none" w="med" len="med"/>
-                      <a:tailEnd type="none" w="med" len="med"/>
-                    </a:lnT>
-                    <a:lnB w="12700" cap="flat" cmpd="sng" algn="ctr">
-                      <a:solidFill>
-                        <a:schemeClr val="tx1"/>
-                      </a:solidFill>
-                      <a:prstDash val="solid"/>
-                      <a:round/>
-                      <a:headEnd type="none" w="med" len="med"/>
-                      <a:tailEnd type="none" w="med" len="med"/>
-                    </a:lnB>
-                    <a:noFill/>
-                  </a:tcPr>
-                </a:tc>
-                <a:tc>
-                  <a:txBody>
-                    <a:bodyPr/>
-                    <a:lstStyle/>
-                    <a:p>
-                      <a:pPr algn="ctr"/>
-                      <a:endParaRPr lang="en-US" b="0" baseline="-25000" dirty="0">
-                        <a:solidFill>
-                          <a:schemeClr val="tx1"/>
-                        </a:solidFill>
-                      </a:endParaRPr>
-                    </a:p>
-                  </a:txBody>
-                  <a:tcPr>
-                    <a:lnL w="12700" cap="flat" cmpd="sng" algn="ctr">
-                      <a:solidFill>
-                        <a:schemeClr val="tx1"/>
-                      </a:solidFill>
-                      <a:prstDash val="solid"/>
-                      <a:round/>
-                      <a:headEnd type="none" w="med" len="med"/>
-                      <a:tailEnd type="none" w="med" len="med"/>
-                    </a:lnL>
-                    <a:lnR w="12700" cap="flat" cmpd="sng" algn="ctr">
-                      <a:solidFill>
-                        <a:schemeClr val="tx1"/>
-                      </a:solidFill>
-                      <a:prstDash val="solid"/>
-                      <a:round/>
-                      <a:headEnd type="none" w="med" len="med"/>
-                      <a:tailEnd type="none" w="med" len="med"/>
-                    </a:lnR>
-                    <a:lnT w="12700" cap="flat" cmpd="sng" algn="ctr">
-                      <a:solidFill>
-                        <a:schemeClr val="tx1"/>
-                      </a:solidFill>
-                      <a:prstDash val="solid"/>
-                      <a:round/>
-                      <a:headEnd type="none" w="med" len="med"/>
-                      <a:tailEnd type="none" w="med" len="med"/>
-                    </a:lnT>
-                    <a:lnB w="12700" cap="flat" cmpd="sng" algn="ctr">
-                      <a:solidFill>
-                        <a:schemeClr val="tx1"/>
-                      </a:solidFill>
-                      <a:prstDash val="solid"/>
-                      <a:round/>
-                      <a:headEnd type="none" w="med" len="med"/>
-                      <a:tailEnd type="none" w="med" len="med"/>
-                    </a:lnB>
-                    <a:noFill/>
-                  </a:tcPr>
-                </a:tc>
-                <a:extLst>
-                  <a:ext uri="{0D108BD9-81ED-4DB2-BD59-A6C34878D82A}">
-                    <a16:rowId xmlns:a16="http://schemas.microsoft.com/office/drawing/2014/main" val="2950598169"/>
-                  </a:ext>
-                </a:extLst>
-              </a:tr>
               <a:tr h="464203">
                 <a:tc>
                   <a:txBody>

</xml_diff>